<commit_message>
update shiny app catalogue
</commit_message>
<xml_diff>
--- a/downloads/pic/collage webapp.pptx
+++ b/downloads/pic/collage webapp.pptx
@@ -105,6 +105,11 @@
       </a:defRPr>
     </a:lvl9pPr>
   </p:defaultTextStyle>
+  <p:extLst>
+    <p:ext uri="{EFAFB233-063F-42B5-8137-9DF3F51BA10A}">
+      <p15:sldGuideLst xmlns:p15="http://schemas.microsoft.com/office/powerpoint/2012/main"/>
+    </p:ext>
+  </p:extLst>
 </p:presentation>
 </file>
 
@@ -150,7 +155,7 @@
           </a:lstStyle>
           <a:p>
             <a:r>
-              <a:rPr lang="sv-SE" smtClean="0"/>
+              <a:rPr lang="sv-SE"/>
               <a:t>Click to edit Master title style</a:t>
             </a:r>
             <a:endParaRPr lang="en-US"/>
@@ -215,7 +220,7 @@
           </a:lstStyle>
           <a:p>
             <a:r>
-              <a:rPr lang="sv-SE" smtClean="0"/>
+              <a:rPr lang="sv-SE"/>
               <a:t>Click to edit Master subtitle style</a:t>
             </a:r>
             <a:endParaRPr lang="en-US"/>
@@ -239,7 +244,7 @@
           <a:p>
             <a:fld id="{E066F882-6797-3C46-A9A3-E0E118B0C007}" type="datetimeFigureOut">
               <a:rPr lang="en-US" smtClean="0"/>
-              <a:t>11/3/16</a:t>
+              <a:t>11/29/19</a:t>
             </a:fld>
             <a:endParaRPr lang="en-US"/>
           </a:p>
@@ -333,7 +338,7 @@
           <a:lstStyle/>
           <a:p>
             <a:r>
-              <a:rPr lang="sv-SE" smtClean="0"/>
+              <a:rPr lang="sv-SE"/>
               <a:t>Click to edit Master title style</a:t>
             </a:r>
             <a:endParaRPr lang="en-US"/>
@@ -357,35 +362,35 @@
           <a:p>
             <a:pPr lvl="0"/>
             <a:r>
-              <a:rPr lang="sv-SE" smtClean="0"/>
+              <a:rPr lang="sv-SE"/>
               <a:t>Click to edit Master text styles</a:t>
             </a:r>
           </a:p>
           <a:p>
             <a:pPr lvl="1"/>
             <a:r>
-              <a:rPr lang="sv-SE" smtClean="0"/>
+              <a:rPr lang="sv-SE"/>
               <a:t>Second level</a:t>
             </a:r>
           </a:p>
           <a:p>
             <a:pPr lvl="2"/>
             <a:r>
-              <a:rPr lang="sv-SE" smtClean="0"/>
+              <a:rPr lang="sv-SE"/>
               <a:t>Third level</a:t>
             </a:r>
           </a:p>
           <a:p>
             <a:pPr lvl="3"/>
             <a:r>
-              <a:rPr lang="sv-SE" smtClean="0"/>
+              <a:rPr lang="sv-SE"/>
               <a:t>Fourth level</a:t>
             </a:r>
           </a:p>
           <a:p>
             <a:pPr lvl="4"/>
             <a:r>
-              <a:rPr lang="sv-SE" smtClean="0"/>
+              <a:rPr lang="sv-SE"/>
               <a:t>Fifth level</a:t>
             </a:r>
             <a:endParaRPr lang="en-US"/>
@@ -409,7 +414,7 @@
           <a:p>
             <a:fld id="{E066F882-6797-3C46-A9A3-E0E118B0C007}" type="datetimeFigureOut">
               <a:rPr lang="en-US" smtClean="0"/>
-              <a:t>11/3/16</a:t>
+              <a:t>11/29/19</a:t>
             </a:fld>
             <a:endParaRPr lang="en-US"/>
           </a:p>
@@ -508,7 +513,7 @@
           <a:lstStyle/>
           <a:p>
             <a:r>
-              <a:rPr lang="sv-SE" smtClean="0"/>
+              <a:rPr lang="sv-SE"/>
               <a:t>Click to edit Master title style</a:t>
             </a:r>
             <a:endParaRPr lang="en-US"/>
@@ -537,35 +542,35 @@
           <a:p>
             <a:pPr lvl="0"/>
             <a:r>
-              <a:rPr lang="sv-SE" smtClean="0"/>
+              <a:rPr lang="sv-SE"/>
               <a:t>Click to edit Master text styles</a:t>
             </a:r>
           </a:p>
           <a:p>
             <a:pPr lvl="1"/>
             <a:r>
-              <a:rPr lang="sv-SE" smtClean="0"/>
+              <a:rPr lang="sv-SE"/>
               <a:t>Second level</a:t>
             </a:r>
           </a:p>
           <a:p>
             <a:pPr lvl="2"/>
             <a:r>
-              <a:rPr lang="sv-SE" smtClean="0"/>
+              <a:rPr lang="sv-SE"/>
               <a:t>Third level</a:t>
             </a:r>
           </a:p>
           <a:p>
             <a:pPr lvl="3"/>
             <a:r>
-              <a:rPr lang="sv-SE" smtClean="0"/>
+              <a:rPr lang="sv-SE"/>
               <a:t>Fourth level</a:t>
             </a:r>
           </a:p>
           <a:p>
             <a:pPr lvl="4"/>
             <a:r>
-              <a:rPr lang="sv-SE" smtClean="0"/>
+              <a:rPr lang="sv-SE"/>
               <a:t>Fifth level</a:t>
             </a:r>
             <a:endParaRPr lang="en-US"/>
@@ -589,7 +594,7 @@
           <a:p>
             <a:fld id="{E066F882-6797-3C46-A9A3-E0E118B0C007}" type="datetimeFigureOut">
               <a:rPr lang="en-US" smtClean="0"/>
-              <a:t>11/3/16</a:t>
+              <a:t>11/29/19</a:t>
             </a:fld>
             <a:endParaRPr lang="en-US"/>
           </a:p>
@@ -683,7 +688,7 @@
           <a:lstStyle/>
           <a:p>
             <a:r>
-              <a:rPr lang="sv-SE" smtClean="0"/>
+              <a:rPr lang="sv-SE"/>
               <a:t>Click to edit Master title style</a:t>
             </a:r>
             <a:endParaRPr lang="en-US"/>
@@ -707,35 +712,35 @@
           <a:p>
             <a:pPr lvl="0"/>
             <a:r>
-              <a:rPr lang="sv-SE" smtClean="0"/>
+              <a:rPr lang="sv-SE"/>
               <a:t>Click to edit Master text styles</a:t>
             </a:r>
           </a:p>
           <a:p>
             <a:pPr lvl="1"/>
             <a:r>
-              <a:rPr lang="sv-SE" smtClean="0"/>
+              <a:rPr lang="sv-SE"/>
               <a:t>Second level</a:t>
             </a:r>
           </a:p>
           <a:p>
             <a:pPr lvl="2"/>
             <a:r>
-              <a:rPr lang="sv-SE" smtClean="0"/>
+              <a:rPr lang="sv-SE"/>
               <a:t>Third level</a:t>
             </a:r>
           </a:p>
           <a:p>
             <a:pPr lvl="3"/>
             <a:r>
-              <a:rPr lang="sv-SE" smtClean="0"/>
+              <a:rPr lang="sv-SE"/>
               <a:t>Fourth level</a:t>
             </a:r>
           </a:p>
           <a:p>
             <a:pPr lvl="4"/>
             <a:r>
-              <a:rPr lang="sv-SE" smtClean="0"/>
+              <a:rPr lang="sv-SE"/>
               <a:t>Fifth level</a:t>
             </a:r>
             <a:endParaRPr lang="en-US"/>
@@ -759,7 +764,7 @@
           <a:p>
             <a:fld id="{E066F882-6797-3C46-A9A3-E0E118B0C007}" type="datetimeFigureOut">
               <a:rPr lang="en-US" smtClean="0"/>
-              <a:t>11/3/16</a:t>
+              <a:t>11/29/19</a:t>
             </a:fld>
             <a:endParaRPr lang="en-US"/>
           </a:p>
@@ -862,7 +867,7 @@
           </a:lstStyle>
           <a:p>
             <a:r>
-              <a:rPr lang="sv-SE" smtClean="0"/>
+              <a:rPr lang="sv-SE"/>
               <a:t>Click to edit Master title style</a:t>
             </a:r>
             <a:endParaRPr lang="en-US"/>
@@ -982,7 +987,7 @@
           <a:p>
             <a:pPr lvl="0"/>
             <a:r>
-              <a:rPr lang="sv-SE" smtClean="0"/>
+              <a:rPr lang="sv-SE"/>
               <a:t>Click to edit Master text styles</a:t>
             </a:r>
           </a:p>
@@ -1005,7 +1010,7 @@
           <a:p>
             <a:fld id="{E066F882-6797-3C46-A9A3-E0E118B0C007}" type="datetimeFigureOut">
               <a:rPr lang="en-US" smtClean="0"/>
-              <a:t>11/3/16</a:t>
+              <a:t>11/29/19</a:t>
             </a:fld>
             <a:endParaRPr lang="en-US"/>
           </a:p>
@@ -1099,7 +1104,7 @@
           <a:lstStyle/>
           <a:p>
             <a:r>
-              <a:rPr lang="sv-SE" smtClean="0"/>
+              <a:rPr lang="sv-SE"/>
               <a:t>Click to edit Master title style</a:t>
             </a:r>
             <a:endParaRPr lang="en-US"/>
@@ -1128,35 +1133,35 @@
           <a:p>
             <a:pPr lvl="0"/>
             <a:r>
-              <a:rPr lang="sv-SE" smtClean="0"/>
+              <a:rPr lang="sv-SE"/>
               <a:t>Click to edit Master text styles</a:t>
             </a:r>
           </a:p>
           <a:p>
             <a:pPr lvl="1"/>
             <a:r>
-              <a:rPr lang="sv-SE" smtClean="0"/>
+              <a:rPr lang="sv-SE"/>
               <a:t>Second level</a:t>
             </a:r>
           </a:p>
           <a:p>
             <a:pPr lvl="2"/>
             <a:r>
-              <a:rPr lang="sv-SE" smtClean="0"/>
+              <a:rPr lang="sv-SE"/>
               <a:t>Third level</a:t>
             </a:r>
           </a:p>
           <a:p>
             <a:pPr lvl="3"/>
             <a:r>
-              <a:rPr lang="sv-SE" smtClean="0"/>
+              <a:rPr lang="sv-SE"/>
               <a:t>Fourth level</a:t>
             </a:r>
           </a:p>
           <a:p>
             <a:pPr lvl="4"/>
             <a:r>
-              <a:rPr lang="sv-SE" smtClean="0"/>
+              <a:rPr lang="sv-SE"/>
               <a:t>Fifth level</a:t>
             </a:r>
             <a:endParaRPr lang="en-US"/>
@@ -1185,35 +1190,35 @@
           <a:p>
             <a:pPr lvl="0"/>
             <a:r>
-              <a:rPr lang="sv-SE" smtClean="0"/>
+              <a:rPr lang="sv-SE"/>
               <a:t>Click to edit Master text styles</a:t>
             </a:r>
           </a:p>
           <a:p>
             <a:pPr lvl="1"/>
             <a:r>
-              <a:rPr lang="sv-SE" smtClean="0"/>
+              <a:rPr lang="sv-SE"/>
               <a:t>Second level</a:t>
             </a:r>
           </a:p>
           <a:p>
             <a:pPr lvl="2"/>
             <a:r>
-              <a:rPr lang="sv-SE" smtClean="0"/>
+              <a:rPr lang="sv-SE"/>
               <a:t>Third level</a:t>
             </a:r>
           </a:p>
           <a:p>
             <a:pPr lvl="3"/>
             <a:r>
-              <a:rPr lang="sv-SE" smtClean="0"/>
+              <a:rPr lang="sv-SE"/>
               <a:t>Fourth level</a:t>
             </a:r>
           </a:p>
           <a:p>
             <a:pPr lvl="4"/>
             <a:r>
-              <a:rPr lang="sv-SE" smtClean="0"/>
+              <a:rPr lang="sv-SE"/>
               <a:t>Fifth level</a:t>
             </a:r>
             <a:endParaRPr lang="en-US"/>
@@ -1237,7 +1242,7 @@
           <a:p>
             <a:fld id="{E066F882-6797-3C46-A9A3-E0E118B0C007}" type="datetimeFigureOut">
               <a:rPr lang="en-US" smtClean="0"/>
-              <a:t>11/3/16</a:t>
+              <a:t>11/29/19</a:t>
             </a:fld>
             <a:endParaRPr lang="en-US"/>
           </a:p>
@@ -1336,7 +1341,7 @@
           <a:lstStyle/>
           <a:p>
             <a:r>
-              <a:rPr lang="sv-SE" smtClean="0"/>
+              <a:rPr lang="sv-SE"/>
               <a:t>Click to edit Master title style</a:t>
             </a:r>
             <a:endParaRPr lang="en-US"/>
@@ -1402,7 +1407,7 @@
           <a:p>
             <a:pPr lvl="0"/>
             <a:r>
-              <a:rPr lang="sv-SE" smtClean="0"/>
+              <a:rPr lang="sv-SE"/>
               <a:t>Click to edit Master text styles</a:t>
             </a:r>
           </a:p>
@@ -1430,35 +1435,35 @@
           <a:p>
             <a:pPr lvl="0"/>
             <a:r>
-              <a:rPr lang="sv-SE" smtClean="0"/>
+              <a:rPr lang="sv-SE"/>
               <a:t>Click to edit Master text styles</a:t>
             </a:r>
           </a:p>
           <a:p>
             <a:pPr lvl="1"/>
             <a:r>
-              <a:rPr lang="sv-SE" smtClean="0"/>
+              <a:rPr lang="sv-SE"/>
               <a:t>Second level</a:t>
             </a:r>
           </a:p>
           <a:p>
             <a:pPr lvl="2"/>
             <a:r>
-              <a:rPr lang="sv-SE" smtClean="0"/>
+              <a:rPr lang="sv-SE"/>
               <a:t>Third level</a:t>
             </a:r>
           </a:p>
           <a:p>
             <a:pPr lvl="3"/>
             <a:r>
-              <a:rPr lang="sv-SE" smtClean="0"/>
+              <a:rPr lang="sv-SE"/>
               <a:t>Fourth level</a:t>
             </a:r>
           </a:p>
           <a:p>
             <a:pPr lvl="4"/>
             <a:r>
-              <a:rPr lang="sv-SE" smtClean="0"/>
+              <a:rPr lang="sv-SE"/>
               <a:t>Fifth level</a:t>
             </a:r>
             <a:endParaRPr lang="en-US"/>
@@ -1524,7 +1529,7 @@
           <a:p>
             <a:pPr lvl="0"/>
             <a:r>
-              <a:rPr lang="sv-SE" smtClean="0"/>
+              <a:rPr lang="sv-SE"/>
               <a:t>Click to edit Master text styles</a:t>
             </a:r>
           </a:p>
@@ -1552,35 +1557,35 @@
           <a:p>
             <a:pPr lvl="0"/>
             <a:r>
-              <a:rPr lang="sv-SE" smtClean="0"/>
+              <a:rPr lang="sv-SE"/>
               <a:t>Click to edit Master text styles</a:t>
             </a:r>
           </a:p>
           <a:p>
             <a:pPr lvl="1"/>
             <a:r>
-              <a:rPr lang="sv-SE" smtClean="0"/>
+              <a:rPr lang="sv-SE"/>
               <a:t>Second level</a:t>
             </a:r>
           </a:p>
           <a:p>
             <a:pPr lvl="2"/>
             <a:r>
-              <a:rPr lang="sv-SE" smtClean="0"/>
+              <a:rPr lang="sv-SE"/>
               <a:t>Third level</a:t>
             </a:r>
           </a:p>
           <a:p>
             <a:pPr lvl="3"/>
             <a:r>
-              <a:rPr lang="sv-SE" smtClean="0"/>
+              <a:rPr lang="sv-SE"/>
               <a:t>Fourth level</a:t>
             </a:r>
           </a:p>
           <a:p>
             <a:pPr lvl="4"/>
             <a:r>
-              <a:rPr lang="sv-SE" smtClean="0"/>
+              <a:rPr lang="sv-SE"/>
               <a:t>Fifth level</a:t>
             </a:r>
             <a:endParaRPr lang="en-US"/>
@@ -1604,7 +1609,7 @@
           <a:p>
             <a:fld id="{E066F882-6797-3C46-A9A3-E0E118B0C007}" type="datetimeFigureOut">
               <a:rPr lang="en-US" smtClean="0"/>
-              <a:t>11/3/16</a:t>
+              <a:t>11/29/19</a:t>
             </a:fld>
             <a:endParaRPr lang="en-US"/>
           </a:p>
@@ -1698,7 +1703,7 @@
           <a:lstStyle/>
           <a:p>
             <a:r>
-              <a:rPr lang="sv-SE" smtClean="0"/>
+              <a:rPr lang="sv-SE"/>
               <a:t>Click to edit Master title style</a:t>
             </a:r>
             <a:endParaRPr lang="en-US"/>
@@ -1722,7 +1727,7 @@
           <a:p>
             <a:fld id="{E066F882-6797-3C46-A9A3-E0E118B0C007}" type="datetimeFigureOut">
               <a:rPr lang="en-US" smtClean="0"/>
-              <a:t>11/3/16</a:t>
+              <a:t>11/29/19</a:t>
             </a:fld>
             <a:endParaRPr lang="en-US"/>
           </a:p>
@@ -1817,7 +1822,7 @@
           <a:p>
             <a:fld id="{E066F882-6797-3C46-A9A3-E0E118B0C007}" type="datetimeFigureOut">
               <a:rPr lang="en-US" smtClean="0"/>
-              <a:t>11/3/16</a:t>
+              <a:t>11/29/19</a:t>
             </a:fld>
             <a:endParaRPr lang="en-US"/>
           </a:p>
@@ -1920,7 +1925,7 @@
           </a:lstStyle>
           <a:p>
             <a:r>
-              <a:rPr lang="sv-SE" smtClean="0"/>
+              <a:rPr lang="sv-SE"/>
               <a:t>Click to edit Master title style</a:t>
             </a:r>
             <a:endParaRPr lang="en-US"/>
@@ -1977,35 +1982,35 @@
           <a:p>
             <a:pPr lvl="0"/>
             <a:r>
-              <a:rPr lang="sv-SE" smtClean="0"/>
+              <a:rPr lang="sv-SE"/>
               <a:t>Click to edit Master text styles</a:t>
             </a:r>
           </a:p>
           <a:p>
             <a:pPr lvl="1"/>
             <a:r>
-              <a:rPr lang="sv-SE" smtClean="0"/>
+              <a:rPr lang="sv-SE"/>
               <a:t>Second level</a:t>
             </a:r>
           </a:p>
           <a:p>
             <a:pPr lvl="2"/>
             <a:r>
-              <a:rPr lang="sv-SE" smtClean="0"/>
+              <a:rPr lang="sv-SE"/>
               <a:t>Third level</a:t>
             </a:r>
           </a:p>
           <a:p>
             <a:pPr lvl="3"/>
             <a:r>
-              <a:rPr lang="sv-SE" smtClean="0"/>
+              <a:rPr lang="sv-SE"/>
               <a:t>Fourth level</a:t>
             </a:r>
           </a:p>
           <a:p>
             <a:pPr lvl="4"/>
             <a:r>
-              <a:rPr lang="sv-SE" smtClean="0"/>
+              <a:rPr lang="sv-SE"/>
               <a:t>Fifth level</a:t>
             </a:r>
             <a:endParaRPr lang="en-US"/>
@@ -2071,7 +2076,7 @@
           <a:p>
             <a:pPr lvl="0"/>
             <a:r>
-              <a:rPr lang="sv-SE" smtClean="0"/>
+              <a:rPr lang="sv-SE"/>
               <a:t>Click to edit Master text styles</a:t>
             </a:r>
           </a:p>
@@ -2094,7 +2099,7 @@
           <a:p>
             <a:fld id="{E066F882-6797-3C46-A9A3-E0E118B0C007}" type="datetimeFigureOut">
               <a:rPr lang="en-US" smtClean="0"/>
-              <a:t>11/3/16</a:t>
+              <a:t>11/29/19</a:t>
             </a:fld>
             <a:endParaRPr lang="en-US"/>
           </a:p>
@@ -2197,7 +2202,7 @@
           </a:lstStyle>
           <a:p>
             <a:r>
-              <a:rPr lang="sv-SE" smtClean="0"/>
+              <a:rPr lang="sv-SE"/>
               <a:t>Click to edit Master title style</a:t>
             </a:r>
             <a:endParaRPr lang="en-US"/>
@@ -2324,7 +2329,7 @@
           <a:p>
             <a:pPr lvl="0"/>
             <a:r>
-              <a:rPr lang="sv-SE" smtClean="0"/>
+              <a:rPr lang="sv-SE"/>
               <a:t>Click to edit Master text styles</a:t>
             </a:r>
           </a:p>
@@ -2347,7 +2352,7 @@
           <a:p>
             <a:fld id="{E066F882-6797-3C46-A9A3-E0E118B0C007}" type="datetimeFigureOut">
               <a:rPr lang="en-US" smtClean="0"/>
-              <a:t>11/3/16</a:t>
+              <a:t>11/29/19</a:t>
             </a:fld>
             <a:endParaRPr lang="en-US"/>
           </a:p>
@@ -2456,7 +2461,7 @@
           <a:lstStyle/>
           <a:p>
             <a:r>
-              <a:rPr lang="sv-SE" smtClean="0"/>
+              <a:rPr lang="sv-SE"/>
               <a:t>Click to edit Master title style</a:t>
             </a:r>
             <a:endParaRPr lang="en-US"/>
@@ -2490,35 +2495,35 @@
           <a:p>
             <a:pPr lvl="0"/>
             <a:r>
-              <a:rPr lang="sv-SE" smtClean="0"/>
+              <a:rPr lang="sv-SE"/>
               <a:t>Click to edit Master text styles</a:t>
             </a:r>
           </a:p>
           <a:p>
             <a:pPr lvl="1"/>
             <a:r>
-              <a:rPr lang="sv-SE" smtClean="0"/>
+              <a:rPr lang="sv-SE"/>
               <a:t>Second level</a:t>
             </a:r>
           </a:p>
           <a:p>
             <a:pPr lvl="2"/>
             <a:r>
-              <a:rPr lang="sv-SE" smtClean="0"/>
+              <a:rPr lang="sv-SE"/>
               <a:t>Third level</a:t>
             </a:r>
           </a:p>
           <a:p>
             <a:pPr lvl="3"/>
             <a:r>
-              <a:rPr lang="sv-SE" smtClean="0"/>
+              <a:rPr lang="sv-SE"/>
               <a:t>Fourth level</a:t>
             </a:r>
           </a:p>
           <a:p>
             <a:pPr lvl="4"/>
             <a:r>
-              <a:rPr lang="sv-SE" smtClean="0"/>
+              <a:rPr lang="sv-SE"/>
               <a:t>Fifth level</a:t>
             </a:r>
             <a:endParaRPr lang="en-US"/>
@@ -2560,7 +2565,7 @@
           <a:p>
             <a:fld id="{E066F882-6797-3C46-A9A3-E0E118B0C007}" type="datetimeFigureOut">
               <a:rPr lang="en-US" smtClean="0"/>
-              <a:t>11/3/16</a:t>
+              <a:t>11/29/19</a:t>
             </a:fld>
             <a:endParaRPr lang="en-US"/>
           </a:p>
@@ -3198,7 +3203,7 @@
         </p:nvGrpSpPr>
         <p:grpSpPr>
           <a:xfrm>
-            <a:off x="2287647" y="1075777"/>
+            <a:off x="2295396" y="1075777"/>
             <a:ext cx="6432068" cy="4410185"/>
             <a:chOff x="2287647" y="1075777"/>
             <a:chExt cx="6432068" cy="4410185"/>

</xml_diff>